<commit_message>
Upload project 3 and the unused project :'(
</commit_message>
<xml_diff>
--- a/Own projects/FinalPresentation.pptx
+++ b/Own projects/FinalPresentation.pptx
@@ -292,7 +292,7 @@
           <a:p>
             <a:fld id="{15880D26-F23D-4A83-AE1A-BA14A5A5CA33}" type="datetimeFigureOut">
               <a:rPr lang="en-US" smtClean="0"/>
-              <a:t>3/25/2025</a:t>
+              <a:t>4/4/2025</a:t>
             </a:fld>
             <a:endParaRPr lang="en-US"/>
           </a:p>
@@ -559,7 +559,7 @@
           <a:p>
             <a:fld id="{15880D26-F23D-4A83-AE1A-BA14A5A5CA33}" type="datetimeFigureOut">
               <a:rPr lang="en-US" smtClean="0"/>
-              <a:t>3/25/2025</a:t>
+              <a:t>4/4/2025</a:t>
             </a:fld>
             <a:endParaRPr lang="en-US"/>
           </a:p>
@@ -790,7 +790,7 @@
           <a:p>
             <a:fld id="{15880D26-F23D-4A83-AE1A-BA14A5A5CA33}" type="datetimeFigureOut">
               <a:rPr lang="en-US" smtClean="0"/>
-              <a:t>3/25/2025</a:t>
+              <a:t>4/4/2025</a:t>
             </a:fld>
             <a:endParaRPr lang="en-US"/>
           </a:p>
@@ -1100,7 +1100,7 @@
           <a:p>
             <a:fld id="{15880D26-F23D-4A83-AE1A-BA14A5A5CA33}" type="datetimeFigureOut">
               <a:rPr lang="en-US" smtClean="0"/>
-              <a:t>3/25/2025</a:t>
+              <a:t>4/4/2025</a:t>
             </a:fld>
             <a:endParaRPr lang="en-US"/>
           </a:p>
@@ -1573,7 +1573,7 @@
           <a:p>
             <a:fld id="{15880D26-F23D-4A83-AE1A-BA14A5A5CA33}" type="datetimeFigureOut">
               <a:rPr lang="en-US" smtClean="0"/>
-              <a:t>3/25/2025</a:t>
+              <a:t>4/4/2025</a:t>
             </a:fld>
             <a:endParaRPr lang="en-US"/>
           </a:p>
@@ -2120,7 +2120,7 @@
           <a:p>
             <a:fld id="{15880D26-F23D-4A83-AE1A-BA14A5A5CA33}" type="datetimeFigureOut">
               <a:rPr lang="en-US" smtClean="0"/>
-              <a:t>3/25/2025</a:t>
+              <a:t>4/4/2025</a:t>
             </a:fld>
             <a:endParaRPr lang="en-US"/>
           </a:p>
@@ -2894,7 +2894,7 @@
           <a:p>
             <a:fld id="{15880D26-F23D-4A83-AE1A-BA14A5A5CA33}" type="datetimeFigureOut">
               <a:rPr lang="en-US" smtClean="0"/>
-              <a:t>3/25/2025</a:t>
+              <a:t>4/4/2025</a:t>
             </a:fld>
             <a:endParaRPr lang="en-US"/>
           </a:p>
@@ -3069,7 +3069,7 @@
           <a:p>
             <a:fld id="{15880D26-F23D-4A83-AE1A-BA14A5A5CA33}" type="datetimeFigureOut">
               <a:rPr lang="en-US" smtClean="0"/>
-              <a:t>3/25/2025</a:t>
+              <a:t>4/4/2025</a:t>
             </a:fld>
             <a:endParaRPr lang="en-US"/>
           </a:p>
@@ -3292,7 +3292,7 @@
           <a:p>
             <a:fld id="{15880D26-F23D-4A83-AE1A-BA14A5A5CA33}" type="datetimeFigureOut">
               <a:rPr lang="en-US" smtClean="0"/>
-              <a:t>3/25/2025</a:t>
+              <a:t>4/4/2025</a:t>
             </a:fld>
             <a:endParaRPr lang="en-US"/>
           </a:p>
@@ -3472,7 +3472,7 @@
           <a:p>
             <a:fld id="{15880D26-F23D-4A83-AE1A-BA14A5A5CA33}" type="datetimeFigureOut">
               <a:rPr lang="en-US" smtClean="0"/>
-              <a:t>3/25/2025</a:t>
+              <a:t>4/4/2025</a:t>
             </a:fld>
             <a:endParaRPr lang="en-US"/>
           </a:p>
@@ -3761,7 +3761,7 @@
           <a:p>
             <a:fld id="{15880D26-F23D-4A83-AE1A-BA14A5A5CA33}" type="datetimeFigureOut">
               <a:rPr lang="en-US" smtClean="0"/>
-              <a:t>3/25/2025</a:t>
+              <a:t>4/4/2025</a:t>
             </a:fld>
             <a:endParaRPr lang="en-US"/>
           </a:p>
@@ -4003,7 +4003,7 @@
           <a:p>
             <a:fld id="{15880D26-F23D-4A83-AE1A-BA14A5A5CA33}" type="datetimeFigureOut">
               <a:rPr lang="en-US" smtClean="0"/>
-              <a:t>3/25/2025</a:t>
+              <a:t>4/4/2025</a:t>
             </a:fld>
             <a:endParaRPr lang="en-US"/>
           </a:p>
@@ -4382,7 +4382,7 @@
           <a:p>
             <a:fld id="{15880D26-F23D-4A83-AE1A-BA14A5A5CA33}" type="datetimeFigureOut">
               <a:rPr lang="en-US" smtClean="0"/>
-              <a:t>3/25/2025</a:t>
+              <a:t>4/4/2025</a:t>
             </a:fld>
             <a:endParaRPr lang="en-US"/>
           </a:p>
@@ -4500,7 +4500,7 @@
           <a:p>
             <a:fld id="{15880D26-F23D-4A83-AE1A-BA14A5A5CA33}" type="datetimeFigureOut">
               <a:rPr lang="en-US" smtClean="0"/>
-              <a:t>3/25/2025</a:t>
+              <a:t>4/4/2025</a:t>
             </a:fld>
             <a:endParaRPr lang="en-US"/>
           </a:p>
@@ -4595,7 +4595,7 @@
           <a:p>
             <a:fld id="{15880D26-F23D-4A83-AE1A-BA14A5A5CA33}" type="datetimeFigureOut">
               <a:rPr lang="en-US" smtClean="0"/>
-              <a:t>3/25/2025</a:t>
+              <a:t>4/4/2025</a:t>
             </a:fld>
             <a:endParaRPr lang="en-US"/>
           </a:p>
@@ -4844,7 +4844,7 @@
           <a:p>
             <a:fld id="{15880D26-F23D-4A83-AE1A-BA14A5A5CA33}" type="datetimeFigureOut">
               <a:rPr lang="en-US" smtClean="0"/>
-              <a:t>3/25/2025</a:t>
+              <a:t>4/4/2025</a:t>
             </a:fld>
             <a:endParaRPr lang="en-US"/>
           </a:p>
@@ -5101,7 +5101,7 @@
           <a:p>
             <a:fld id="{15880D26-F23D-4A83-AE1A-BA14A5A5CA33}" type="datetimeFigureOut">
               <a:rPr lang="en-US" smtClean="0"/>
-              <a:t>3/25/2025</a:t>
+              <a:t>4/4/2025</a:t>
             </a:fld>
             <a:endParaRPr lang="en-US"/>
           </a:p>
@@ -5344,7 +5344,7 @@
           <a:p>
             <a:fld id="{15880D26-F23D-4A83-AE1A-BA14A5A5CA33}" type="datetimeFigureOut">
               <a:rPr lang="en-US" smtClean="0"/>
-              <a:t>3/25/2025</a:t>
+              <a:t>4/4/2025</a:t>
             </a:fld>
             <a:endParaRPr lang="en-US"/>
           </a:p>

</xml_diff>